<commit_message>
apresentação final (?) com notas para a apresentação
</commit_message>
<xml_diff>
--- a/Relatório - Parte I/Home-Massage.pptx
+++ b/Relatório - Parte I/Home-Massage.pptx
@@ -5020,7 +5020,7 @@
   <dgm:whole/>
   <dgm:extLst>
     <a:ext uri="http://schemas.microsoft.com/office/drawing/2008/diagram">
-      <dsp:dataModelExt xmlns:dsp="http://schemas.microsoft.com/office/drawing/2008/diagram" relId="rId6" minVer="http://schemas.openxmlformats.org/drawingml/2006/diagram"/>
+      <dsp:dataModelExt xmlns:dsp="http://schemas.microsoft.com/office/drawing/2008/diagram" relId="rId7" minVer="http://schemas.openxmlformats.org/drawingml/2006/diagram"/>
     </a:ext>
   </dgm:extLst>
 </dgm:dataModel>
@@ -5129,7 +5129,7 @@
           <a:pPr algn="just"/>
           <a:r>
             <a:rPr lang="pt-PT" sz="1800" dirty="0"/>
-            <a:t>Para facilitar o acompanhamento dos funcionários, a empresa deseja ainda que seja desenvolvida uma aplicação móvel.</a:t>
+            <a:t>Para facilitar o acompanhamento dos funcionários, esta plataforma deverá possuir uma zona restrita a estes, e cujo objetivo é a gestão dos serviços.</a:t>
           </a:r>
         </a:p>
       </dgm:t>
@@ -5146,43 +5146,6 @@
       </dgm:t>
     </dgm:pt>
     <dgm:pt modelId="{69C248CD-D64F-4CF2-B158-2457237670A0}" type="sibTrans" cxnId="{F2A327B3-9409-41E8-999C-5759355048D0}">
-      <dgm:prSet/>
-      <dgm:spPr/>
-      <dgm:t>
-        <a:bodyPr/>
-        <a:lstStyle/>
-        <a:p>
-          <a:endParaRPr lang="pt-PT"/>
-        </a:p>
-      </dgm:t>
-    </dgm:pt>
-    <dgm:pt modelId="{B8F96280-A62F-44CB-8B33-3C1E4C7446FE}">
-      <dgm:prSet custT="1"/>
-      <dgm:spPr/>
-      <dgm:t>
-        <a:bodyPr/>
-        <a:lstStyle/>
-        <a:p>
-          <a:pPr algn="just"/>
-          <a:r>
-            <a:rPr lang="pt-PT" sz="1800" dirty="0"/>
-            <a:t>O pagamento do serviço é cobrado no destino e a emissão da fatura é feita via Email e o envio da sua referência via SMS.</a:t>
-          </a:r>
-        </a:p>
-      </dgm:t>
-    </dgm:pt>
-    <dgm:pt modelId="{DE793FB7-CA12-4070-8219-95CF011F0A24}" type="parTrans" cxnId="{92B4EB89-2AB5-45D0-9014-DCA4BEF5AFE1}">
-      <dgm:prSet/>
-      <dgm:spPr/>
-      <dgm:t>
-        <a:bodyPr/>
-        <a:lstStyle/>
-        <a:p>
-          <a:endParaRPr lang="pt-PT"/>
-        </a:p>
-      </dgm:t>
-    </dgm:pt>
-    <dgm:pt modelId="{14C3F697-37C0-4BAA-ABAF-2B7A9BA9344F}" type="sibTrans" cxnId="{92B4EB89-2AB5-45D0-9014-DCA4BEF5AFE1}">
       <dgm:prSet/>
       <dgm:spPr/>
       <dgm:t>
@@ -5212,7 +5175,7 @@
       <dgm:spPr/>
     </dgm:pt>
     <dgm:pt modelId="{60EB8535-28FB-4CA1-8E9F-E877C324CF9F}" type="pres">
-      <dgm:prSet presAssocID="{0461C4F4-0693-491E-867F-4920EBD4742A}" presName="tx1" presStyleLbl="revTx" presStyleIdx="0" presStyleCnt="4" custScaleX="148520"/>
+      <dgm:prSet presAssocID="{0461C4F4-0693-491E-867F-4920EBD4742A}" presName="tx1" presStyleLbl="revTx" presStyleIdx="0" presStyleCnt="3" custScaleX="148520"/>
       <dgm:spPr/>
     </dgm:pt>
     <dgm:pt modelId="{6D3A7670-F2C2-4ED6-8B62-E9DE4D629F03}" type="pres">
@@ -5232,7 +5195,7 @@
       <dgm:spPr/>
     </dgm:pt>
     <dgm:pt modelId="{9B9C5CE9-A737-42D6-AD71-55BC7C1FB9D7}" type="pres">
-      <dgm:prSet presAssocID="{269CCB5D-48F9-45E9-92EB-483FF5F04045}" presName="tx2" presStyleLbl="revTx" presStyleIdx="1" presStyleCnt="4"/>
+      <dgm:prSet presAssocID="{269CCB5D-48F9-45E9-92EB-483FF5F04045}" presName="tx2" presStyleLbl="revTx" presStyleIdx="1" presStyleCnt="3"/>
       <dgm:spPr/>
     </dgm:pt>
     <dgm:pt modelId="{7A04911C-B80A-4059-B7BE-288159313EC1}" type="pres">
@@ -5240,7 +5203,7 @@
       <dgm:spPr/>
     </dgm:pt>
     <dgm:pt modelId="{E0F7F51D-90F0-44AA-99A7-5B8B2447EC79}" type="pres">
-      <dgm:prSet presAssocID="{269CCB5D-48F9-45E9-92EB-483FF5F04045}" presName="thinLine2b" presStyleLbl="callout" presStyleIdx="0" presStyleCnt="3"/>
+      <dgm:prSet presAssocID="{269CCB5D-48F9-45E9-92EB-483FF5F04045}" presName="thinLine2b" presStyleLbl="callout" presStyleIdx="0" presStyleCnt="2"/>
       <dgm:spPr/>
     </dgm:pt>
     <dgm:pt modelId="{7913B565-F359-4B4E-BD3C-6811F56D9B15}" type="pres">
@@ -5256,7 +5219,7 @@
       <dgm:spPr/>
     </dgm:pt>
     <dgm:pt modelId="{8B3C77F5-05B2-418C-AC6B-2EF0809EC845}" type="pres">
-      <dgm:prSet presAssocID="{00EC10E7-62A2-4CE5-959F-964468135F65}" presName="tx2" presStyleLbl="revTx" presStyleIdx="2" presStyleCnt="4"/>
+      <dgm:prSet presAssocID="{00EC10E7-62A2-4CE5-959F-964468135F65}" presName="tx2" presStyleLbl="revTx" presStyleIdx="2" presStyleCnt="3"/>
       <dgm:spPr/>
     </dgm:pt>
     <dgm:pt modelId="{2A4718DC-E613-4D05-8928-D2D8D5DE863D}" type="pres">
@@ -5264,42 +5227,16 @@
       <dgm:spPr/>
     </dgm:pt>
     <dgm:pt modelId="{321CB34B-7F12-47BE-ADEA-38D180AD3111}" type="pres">
-      <dgm:prSet presAssocID="{00EC10E7-62A2-4CE5-959F-964468135F65}" presName="thinLine2b" presStyleLbl="callout" presStyleIdx="1" presStyleCnt="3"/>
+      <dgm:prSet presAssocID="{00EC10E7-62A2-4CE5-959F-964468135F65}" presName="thinLine2b" presStyleLbl="callout" presStyleIdx="1" presStyleCnt="2"/>
       <dgm:spPr/>
     </dgm:pt>
     <dgm:pt modelId="{D9CD5CD6-CA14-4B7C-BB5D-F09A8374A76A}" type="pres">
       <dgm:prSet presAssocID="{00EC10E7-62A2-4CE5-959F-964468135F65}" presName="vertSpace2b" presStyleCnt="0"/>
       <dgm:spPr/>
     </dgm:pt>
-    <dgm:pt modelId="{850D740D-95F6-4922-82EC-CE63B66028B0}" type="pres">
-      <dgm:prSet presAssocID="{B8F96280-A62F-44CB-8B33-3C1E4C7446FE}" presName="horz2" presStyleCnt="0"/>
-      <dgm:spPr/>
-    </dgm:pt>
-    <dgm:pt modelId="{3D9C79C0-3F9F-4BA7-9D77-04618EBB68C8}" type="pres">
-      <dgm:prSet presAssocID="{B8F96280-A62F-44CB-8B33-3C1E4C7446FE}" presName="horzSpace2" presStyleCnt="0"/>
-      <dgm:spPr/>
-    </dgm:pt>
-    <dgm:pt modelId="{1B4CB856-EB8A-4818-B7FD-0A1EE3621FAA}" type="pres">
-      <dgm:prSet presAssocID="{B8F96280-A62F-44CB-8B33-3C1E4C7446FE}" presName="tx2" presStyleLbl="revTx" presStyleIdx="3" presStyleCnt="4"/>
-      <dgm:spPr/>
-    </dgm:pt>
-    <dgm:pt modelId="{783638F3-B539-4037-A5D0-77F1B7E2BD75}" type="pres">
-      <dgm:prSet presAssocID="{B8F96280-A62F-44CB-8B33-3C1E4C7446FE}" presName="vert2" presStyleCnt="0"/>
-      <dgm:spPr/>
-    </dgm:pt>
-    <dgm:pt modelId="{9F25DF1D-C662-4F54-8A6B-5C11162BAFF4}" type="pres">
-      <dgm:prSet presAssocID="{B8F96280-A62F-44CB-8B33-3C1E4C7446FE}" presName="thinLine2b" presStyleLbl="callout" presStyleIdx="2" presStyleCnt="3"/>
-      <dgm:spPr/>
-    </dgm:pt>
-    <dgm:pt modelId="{928C35CD-C61C-4287-BFB4-A2C974A43888}" type="pres">
-      <dgm:prSet presAssocID="{B8F96280-A62F-44CB-8B33-3C1E4C7446FE}" presName="vertSpace2b" presStyleCnt="0"/>
-      <dgm:spPr/>
-    </dgm:pt>
   </dgm:ptLst>
   <dgm:cxnLst>
-    <dgm:cxn modelId="{5605F138-6B3C-4CBB-9481-6FF4E625D2B6}" type="presOf" srcId="{B8F96280-A62F-44CB-8B33-3C1E4C7446FE}" destId="{1B4CB856-EB8A-4818-B7FD-0A1EE3621FAA}" srcOrd="0" destOrd="0" presId="urn:microsoft.com/office/officeart/2008/layout/LinedList"/>
     <dgm:cxn modelId="{2FB61F6D-9DB7-48C7-8FBF-6A035B8ED441}" type="presOf" srcId="{0461C4F4-0693-491E-867F-4920EBD4742A}" destId="{60EB8535-28FB-4CA1-8E9F-E877C324CF9F}" srcOrd="0" destOrd="0" presId="urn:microsoft.com/office/officeart/2008/layout/LinedList"/>
-    <dgm:cxn modelId="{92B4EB89-2AB5-45D0-9014-DCA4BEF5AFE1}" srcId="{0461C4F4-0693-491E-867F-4920EBD4742A}" destId="{B8F96280-A62F-44CB-8B33-3C1E4C7446FE}" srcOrd="2" destOrd="0" parTransId="{DE793FB7-CA12-4070-8219-95CF011F0A24}" sibTransId="{14C3F697-37C0-4BAA-ABAF-2B7A9BA9344F}"/>
     <dgm:cxn modelId="{F2A327B3-9409-41E8-999C-5759355048D0}" srcId="{0461C4F4-0693-491E-867F-4920EBD4742A}" destId="{00EC10E7-62A2-4CE5-959F-964468135F65}" srcOrd="1" destOrd="0" parTransId="{2AFD2021-417E-4EF4-87AB-98B2EF5D02BE}" sibTransId="{69C248CD-D64F-4CF2-B158-2457237670A0}"/>
     <dgm:cxn modelId="{C4B378E1-2B45-4F63-B4A3-1B6978760AE7}" type="presOf" srcId="{00EC10E7-62A2-4CE5-959F-964468135F65}" destId="{8B3C77F5-05B2-418C-AC6B-2EF0809EC845}" srcOrd="0" destOrd="0" presId="urn:microsoft.com/office/officeart/2008/layout/LinedList"/>
     <dgm:cxn modelId="{E12A61ED-C0CE-4137-A23F-6156EA2BA1E3}" type="presOf" srcId="{269CCB5D-48F9-45E9-92EB-483FF5F04045}" destId="{9B9C5CE9-A737-42D6-AD71-55BC7C1FB9D7}" srcOrd="0" destOrd="0" presId="urn:microsoft.com/office/officeart/2008/layout/LinedList"/>
@@ -5323,18 +5260,12 @@
     <dgm:cxn modelId="{BB131AE1-D5B5-4BA7-9DBA-1A25656FF90C}" type="presParOf" srcId="{1DB116E7-7AE1-4B54-85A7-D9B1F8198DCE}" destId="{2A4718DC-E613-4D05-8928-D2D8D5DE863D}" srcOrd="2" destOrd="0" presId="urn:microsoft.com/office/officeart/2008/layout/LinedList"/>
     <dgm:cxn modelId="{C84C4285-E9CF-4D91-935C-41F2810339CD}" type="presParOf" srcId="{6D3A7670-F2C2-4ED6-8B62-E9DE4D629F03}" destId="{321CB34B-7F12-47BE-ADEA-38D180AD3111}" srcOrd="5" destOrd="0" presId="urn:microsoft.com/office/officeart/2008/layout/LinedList"/>
     <dgm:cxn modelId="{623D3E28-45AD-46F6-AFF6-8535C742B7EC}" type="presParOf" srcId="{6D3A7670-F2C2-4ED6-8B62-E9DE4D629F03}" destId="{D9CD5CD6-CA14-4B7C-BB5D-F09A8374A76A}" srcOrd="6" destOrd="0" presId="urn:microsoft.com/office/officeart/2008/layout/LinedList"/>
-    <dgm:cxn modelId="{CF37699A-F4B5-426A-A6F5-9706784D5BE5}" type="presParOf" srcId="{6D3A7670-F2C2-4ED6-8B62-E9DE4D629F03}" destId="{850D740D-95F6-4922-82EC-CE63B66028B0}" srcOrd="7" destOrd="0" presId="urn:microsoft.com/office/officeart/2008/layout/LinedList"/>
-    <dgm:cxn modelId="{3A768B9E-FA7E-498F-ABA7-C014751AC0C3}" type="presParOf" srcId="{850D740D-95F6-4922-82EC-CE63B66028B0}" destId="{3D9C79C0-3F9F-4BA7-9D77-04618EBB68C8}" srcOrd="0" destOrd="0" presId="urn:microsoft.com/office/officeart/2008/layout/LinedList"/>
-    <dgm:cxn modelId="{28F71433-64DA-416F-A0E1-AB5ABAA02AED}" type="presParOf" srcId="{850D740D-95F6-4922-82EC-CE63B66028B0}" destId="{1B4CB856-EB8A-4818-B7FD-0A1EE3621FAA}" srcOrd="1" destOrd="0" presId="urn:microsoft.com/office/officeart/2008/layout/LinedList"/>
-    <dgm:cxn modelId="{BDDFB616-03A5-450E-BE03-B4BCCF897DE0}" type="presParOf" srcId="{850D740D-95F6-4922-82EC-CE63B66028B0}" destId="{783638F3-B539-4037-A5D0-77F1B7E2BD75}" srcOrd="2" destOrd="0" presId="urn:microsoft.com/office/officeart/2008/layout/LinedList"/>
-    <dgm:cxn modelId="{58328672-1F18-466A-A4BA-DF117033CD89}" type="presParOf" srcId="{6D3A7670-F2C2-4ED6-8B62-E9DE4D629F03}" destId="{9F25DF1D-C662-4F54-8A6B-5C11162BAFF4}" srcOrd="8" destOrd="0" presId="urn:microsoft.com/office/officeart/2008/layout/LinedList"/>
-    <dgm:cxn modelId="{5A36E780-E7B4-4BF8-8618-F04AA074400D}" type="presParOf" srcId="{6D3A7670-F2C2-4ED6-8B62-E9DE4D629F03}" destId="{928C35CD-C61C-4287-BFB4-A2C974A43888}" srcOrd="9" destOrd="0" presId="urn:microsoft.com/office/officeart/2008/layout/LinedList"/>
   </dgm:cxnLst>
   <dgm:bg/>
   <dgm:whole/>
   <dgm:extLst>
     <a:ext uri="http://schemas.microsoft.com/office/drawing/2008/diagram">
-      <dsp:dataModelExt xmlns:dsp="http://schemas.microsoft.com/office/drawing/2008/diagram" relId="rId6" minVer="http://schemas.openxmlformats.org/drawingml/2006/diagram"/>
+      <dsp:dataModelExt xmlns:dsp="http://schemas.microsoft.com/office/drawing/2008/diagram" relId="rId7" minVer="http://schemas.openxmlformats.org/drawingml/2006/diagram"/>
     </a:ext>
   </dgm:extLst>
 </dgm:dataModel>
@@ -5615,7 +5546,7 @@
         <a:p>
           <a:r>
             <a:rPr lang="pt-PT" dirty="0"/>
-            <a:t>Cliente poderia, na conveniência e comodidade da sua casa, requisitar e usufruir dos serviços da </a:t>
+            <a:t>Cliente poderá, na conveniência e comodidade da sua casa, requisitar e usufruir dos serviços da </a:t>
           </a:r>
           <a:r>
             <a:rPr lang="pt-PT" i="1" dirty="0"/>
@@ -5830,6 +5761,42 @@
         </a:p>
       </dgm:t>
     </dgm:pt>
+    <dgm:pt modelId="{93EEBDE6-468C-4CB4-AAF3-FF14A0458AA3}">
+      <dgm:prSet phldrT="[Texto]"/>
+      <dgm:spPr/>
+      <dgm:t>
+        <a:bodyPr/>
+        <a:lstStyle/>
+        <a:p>
+          <a:r>
+            <a:rPr lang="pt-PT" dirty="0"/>
+            <a:t>…</a:t>
+          </a:r>
+        </a:p>
+      </dgm:t>
+    </dgm:pt>
+    <dgm:pt modelId="{F62839A6-9009-45F7-A0C2-498D88B8DCAC}" type="parTrans" cxnId="{601B5524-B3F4-4314-901E-37B3907ABADE}">
+      <dgm:prSet/>
+      <dgm:spPr/>
+      <dgm:t>
+        <a:bodyPr/>
+        <a:lstStyle/>
+        <a:p>
+          <a:endParaRPr lang="pt-PT"/>
+        </a:p>
+      </dgm:t>
+    </dgm:pt>
+    <dgm:pt modelId="{49B557A6-80CC-4A1E-B58A-3DFFAA05D248}" type="sibTrans" cxnId="{601B5524-B3F4-4314-901E-37B3907ABADE}">
+      <dgm:prSet/>
+      <dgm:spPr/>
+      <dgm:t>
+        <a:bodyPr/>
+        <a:lstStyle/>
+        <a:p>
+          <a:endParaRPr lang="pt-PT"/>
+        </a:p>
+      </dgm:t>
+    </dgm:pt>
     <dgm:pt modelId="{7129A45C-BCD2-440D-8B93-31CBE031D6E8}" type="pres">
       <dgm:prSet presAssocID="{6706C9B2-0538-4EA4-991D-1FB2182780DB}" presName="vert0" presStyleCnt="0">
         <dgm:presLayoutVars>
@@ -5849,7 +5816,7 @@
       <dgm:spPr/>
     </dgm:pt>
     <dgm:pt modelId="{FB149138-111F-48FF-9DF7-A022DF6CB842}" type="pres">
-      <dgm:prSet presAssocID="{E00AA4F6-69D8-492A-8F20-C329DA6E9116}" presName="tx1" presStyleLbl="revTx" presStyleIdx="0" presStyleCnt="7"/>
+      <dgm:prSet presAssocID="{E00AA4F6-69D8-492A-8F20-C329DA6E9116}" presName="tx1" presStyleLbl="revTx" presStyleIdx="0" presStyleCnt="8"/>
       <dgm:spPr/>
     </dgm:pt>
     <dgm:pt modelId="{E77E1018-C492-4EC2-95D6-31AAEC56D154}" type="pres">
@@ -5869,7 +5836,7 @@
       <dgm:spPr/>
     </dgm:pt>
     <dgm:pt modelId="{E7709EAC-8B70-494B-8448-F1C436CBC32B}" type="pres">
-      <dgm:prSet presAssocID="{0F7D7D6C-9567-4389-86C4-1F914BB5B828}" presName="tx2" presStyleLbl="revTx" presStyleIdx="1" presStyleCnt="7"/>
+      <dgm:prSet presAssocID="{0F7D7D6C-9567-4389-86C4-1F914BB5B828}" presName="tx2" presStyleLbl="revTx" presStyleIdx="1" presStyleCnt="8"/>
       <dgm:spPr/>
     </dgm:pt>
     <dgm:pt modelId="{D4A94314-D002-46FE-98DB-FD18C7CDB80A}" type="pres">
@@ -5877,7 +5844,7 @@
       <dgm:spPr/>
     </dgm:pt>
     <dgm:pt modelId="{71C02923-358E-4D11-8CA5-24CA6CB07411}" type="pres">
-      <dgm:prSet presAssocID="{0F7D7D6C-9567-4389-86C4-1F914BB5B828}" presName="thinLine2b" presStyleLbl="callout" presStyleIdx="0" presStyleCnt="5"/>
+      <dgm:prSet presAssocID="{0F7D7D6C-9567-4389-86C4-1F914BB5B828}" presName="thinLine2b" presStyleLbl="callout" presStyleIdx="0" presStyleCnt="6"/>
       <dgm:spPr/>
     </dgm:pt>
     <dgm:pt modelId="{8B63EDEF-95CE-48FA-AED5-35069D8D41FF}" type="pres">
@@ -5893,7 +5860,7 @@
       <dgm:spPr/>
     </dgm:pt>
     <dgm:pt modelId="{703B5C06-E593-4FBC-BD43-B0B5B0C7511B}" type="pres">
-      <dgm:prSet presAssocID="{93764F59-C7F4-4D1E-8253-3CD00557CD84}" presName="tx2" presStyleLbl="revTx" presStyleIdx="2" presStyleCnt="7"/>
+      <dgm:prSet presAssocID="{93764F59-C7F4-4D1E-8253-3CD00557CD84}" presName="tx2" presStyleLbl="revTx" presStyleIdx="2" presStyleCnt="8"/>
       <dgm:spPr/>
     </dgm:pt>
     <dgm:pt modelId="{6175DF0E-FA12-4785-BF40-A3C74DB8437D}" type="pres">
@@ -5901,7 +5868,7 @@
       <dgm:spPr/>
     </dgm:pt>
     <dgm:pt modelId="{39FC92C8-A4E1-4296-874B-40667F5C00D7}" type="pres">
-      <dgm:prSet presAssocID="{93764F59-C7F4-4D1E-8253-3CD00557CD84}" presName="thinLine2b" presStyleLbl="callout" presStyleIdx="1" presStyleCnt="5"/>
+      <dgm:prSet presAssocID="{93764F59-C7F4-4D1E-8253-3CD00557CD84}" presName="thinLine2b" presStyleLbl="callout" presStyleIdx="1" presStyleCnt="6"/>
       <dgm:spPr/>
     </dgm:pt>
     <dgm:pt modelId="{18312C69-CDD5-473A-A161-66FCAF36D0A6}" type="pres">
@@ -5917,7 +5884,7 @@
       <dgm:spPr/>
     </dgm:pt>
     <dgm:pt modelId="{A28EABA6-AA01-47E7-B080-AEB024760DC4}" type="pres">
-      <dgm:prSet presAssocID="{96536070-1628-4716-97C2-CEC114DEB539}" presName="tx1" presStyleLbl="revTx" presStyleIdx="3" presStyleCnt="7"/>
+      <dgm:prSet presAssocID="{96536070-1628-4716-97C2-CEC114DEB539}" presName="tx1" presStyleLbl="revTx" presStyleIdx="3" presStyleCnt="8"/>
       <dgm:spPr/>
     </dgm:pt>
     <dgm:pt modelId="{EDB2617B-4BAF-4115-91A3-3B53D772F336}" type="pres">
@@ -5937,7 +5904,7 @@
       <dgm:spPr/>
     </dgm:pt>
     <dgm:pt modelId="{1788E2B6-DB17-4988-A134-2185D9740257}" type="pres">
-      <dgm:prSet presAssocID="{24A68024-527F-4F3F-8B9C-B8D92432D1D6}" presName="tx2" presStyleLbl="revTx" presStyleIdx="4" presStyleCnt="7"/>
+      <dgm:prSet presAssocID="{24A68024-527F-4F3F-8B9C-B8D92432D1D6}" presName="tx2" presStyleLbl="revTx" presStyleIdx="4" presStyleCnt="8"/>
       <dgm:spPr/>
     </dgm:pt>
     <dgm:pt modelId="{E82DC964-8737-4F43-860D-830570E7EF11}" type="pres">
@@ -5945,7 +5912,7 @@
       <dgm:spPr/>
     </dgm:pt>
     <dgm:pt modelId="{D174253D-7B14-411B-B41B-255809F7683E}" type="pres">
-      <dgm:prSet presAssocID="{24A68024-527F-4F3F-8B9C-B8D92432D1D6}" presName="thinLine2b" presStyleLbl="callout" presStyleIdx="2" presStyleCnt="5"/>
+      <dgm:prSet presAssocID="{24A68024-527F-4F3F-8B9C-B8D92432D1D6}" presName="thinLine2b" presStyleLbl="callout" presStyleIdx="2" presStyleCnt="6"/>
       <dgm:spPr/>
     </dgm:pt>
     <dgm:pt modelId="{26A86D7C-4B0F-47A9-9C55-799FB30E4DA0}" type="pres">
@@ -5961,7 +5928,7 @@
       <dgm:spPr/>
     </dgm:pt>
     <dgm:pt modelId="{FCD21B31-0F3B-4A00-A35B-939093375820}" type="pres">
-      <dgm:prSet presAssocID="{85C6C6EE-48C7-46A5-A5BB-89EC214BCB87}" presName="tx2" presStyleLbl="revTx" presStyleIdx="5" presStyleCnt="7"/>
+      <dgm:prSet presAssocID="{85C6C6EE-48C7-46A5-A5BB-89EC214BCB87}" presName="tx2" presStyleLbl="revTx" presStyleIdx="5" presStyleCnt="8"/>
       <dgm:spPr/>
     </dgm:pt>
     <dgm:pt modelId="{32B2B94D-A952-4671-88A9-27417FA3B69D}" type="pres">
@@ -5969,7 +5936,7 @@
       <dgm:spPr/>
     </dgm:pt>
     <dgm:pt modelId="{DDBACBE5-46EE-47BD-AB63-C6419C074411}" type="pres">
-      <dgm:prSet presAssocID="{85C6C6EE-48C7-46A5-A5BB-89EC214BCB87}" presName="thinLine2b" presStyleLbl="callout" presStyleIdx="3" presStyleCnt="5"/>
+      <dgm:prSet presAssocID="{85C6C6EE-48C7-46A5-A5BB-89EC214BCB87}" presName="thinLine2b" presStyleLbl="callout" presStyleIdx="3" presStyleCnt="6"/>
       <dgm:spPr/>
     </dgm:pt>
     <dgm:pt modelId="{CE8095D3-1C24-474D-A4ED-402633716462}" type="pres">
@@ -5985,7 +5952,7 @@
       <dgm:spPr/>
     </dgm:pt>
     <dgm:pt modelId="{E997C506-A0AB-4867-A82A-A950080E7778}" type="pres">
-      <dgm:prSet presAssocID="{AD3D677B-95B4-44B1-B990-14C14215B1DE}" presName="tx2" presStyleLbl="revTx" presStyleIdx="6" presStyleCnt="7"/>
+      <dgm:prSet presAssocID="{AD3D677B-95B4-44B1-B990-14C14215B1DE}" presName="tx2" presStyleLbl="revTx" presStyleIdx="6" presStyleCnt="8"/>
       <dgm:spPr/>
     </dgm:pt>
     <dgm:pt modelId="{8188D5FE-7AFC-4805-8891-310A8BB78498}" type="pres">
@@ -5993,17 +5960,43 @@
       <dgm:spPr/>
     </dgm:pt>
     <dgm:pt modelId="{F5238EE6-7B59-47A2-B9A7-A62858BD7C7F}" type="pres">
-      <dgm:prSet presAssocID="{AD3D677B-95B4-44B1-B990-14C14215B1DE}" presName="thinLine2b" presStyleLbl="callout" presStyleIdx="4" presStyleCnt="5"/>
+      <dgm:prSet presAssocID="{AD3D677B-95B4-44B1-B990-14C14215B1DE}" presName="thinLine2b" presStyleLbl="callout" presStyleIdx="4" presStyleCnt="6"/>
       <dgm:spPr/>
     </dgm:pt>
     <dgm:pt modelId="{3058AACB-B9A2-4F6C-8470-72051CCE5202}" type="pres">
       <dgm:prSet presAssocID="{AD3D677B-95B4-44B1-B990-14C14215B1DE}" presName="vertSpace2b" presStyleCnt="0"/>
       <dgm:spPr/>
     </dgm:pt>
+    <dgm:pt modelId="{67B4E9A2-5DDD-4102-BC74-E853574430C7}" type="pres">
+      <dgm:prSet presAssocID="{93EEBDE6-468C-4CB4-AAF3-FF14A0458AA3}" presName="horz2" presStyleCnt="0"/>
+      <dgm:spPr/>
+    </dgm:pt>
+    <dgm:pt modelId="{97C0884A-DC70-43BD-8B8D-F38E88118A9C}" type="pres">
+      <dgm:prSet presAssocID="{93EEBDE6-468C-4CB4-AAF3-FF14A0458AA3}" presName="horzSpace2" presStyleCnt="0"/>
+      <dgm:spPr/>
+    </dgm:pt>
+    <dgm:pt modelId="{6BEA1EB0-BDDF-4B8F-93C0-71DCE27D9230}" type="pres">
+      <dgm:prSet presAssocID="{93EEBDE6-468C-4CB4-AAF3-FF14A0458AA3}" presName="tx2" presStyleLbl="revTx" presStyleIdx="7" presStyleCnt="8"/>
+      <dgm:spPr/>
+    </dgm:pt>
+    <dgm:pt modelId="{218A786B-2A4E-4921-9ABE-712747D2584E}" type="pres">
+      <dgm:prSet presAssocID="{93EEBDE6-468C-4CB4-AAF3-FF14A0458AA3}" presName="vert2" presStyleCnt="0"/>
+      <dgm:spPr/>
+    </dgm:pt>
+    <dgm:pt modelId="{AC8E75E8-D438-48A1-A8B0-9CB830056921}" type="pres">
+      <dgm:prSet presAssocID="{93EEBDE6-468C-4CB4-AAF3-FF14A0458AA3}" presName="thinLine2b" presStyleLbl="callout" presStyleIdx="5" presStyleCnt="6"/>
+      <dgm:spPr/>
+    </dgm:pt>
+    <dgm:pt modelId="{4EA91243-ECAF-419C-99B8-F664B383E784}" type="pres">
+      <dgm:prSet presAssocID="{93EEBDE6-468C-4CB4-AAF3-FF14A0458AA3}" presName="vertSpace2b" presStyleCnt="0"/>
+      <dgm:spPr/>
+    </dgm:pt>
   </dgm:ptLst>
   <dgm:cxnLst>
     <dgm:cxn modelId="{292F230A-7F7D-4315-8EE5-5A86C86998DA}" srcId="{E00AA4F6-69D8-492A-8F20-C329DA6E9116}" destId="{0F7D7D6C-9567-4389-86C4-1F914BB5B828}" srcOrd="0" destOrd="0" parTransId="{01AB1D71-6B70-4C2A-BDD5-D93557FC9B04}" sibTransId="{EA862E61-B402-4210-A49F-D4506307D5FE}"/>
+    <dgm:cxn modelId="{601B5524-B3F4-4314-901E-37B3907ABADE}" srcId="{96536070-1628-4716-97C2-CEC114DEB539}" destId="{93EEBDE6-468C-4CB4-AAF3-FF14A0458AA3}" srcOrd="3" destOrd="0" parTransId="{F62839A6-9009-45F7-A0C2-498D88B8DCAC}" sibTransId="{49B557A6-80CC-4A1E-B58A-3DFFAA05D248}"/>
     <dgm:cxn modelId="{88158729-16E9-452F-A358-351F0E03C3AD}" srcId="{96536070-1628-4716-97C2-CEC114DEB539}" destId="{AD3D677B-95B4-44B1-B990-14C14215B1DE}" srcOrd="2" destOrd="0" parTransId="{35626AF7-B1DF-4D0C-8844-7FDDFE0C84E2}" sibTransId="{0F5468E5-3A36-4547-852D-9D2CBEB48687}"/>
+    <dgm:cxn modelId="{6C661533-198E-435A-8B51-914951764BDE}" type="presOf" srcId="{93EEBDE6-468C-4CB4-AAF3-FF14A0458AA3}" destId="{6BEA1EB0-BDDF-4B8F-93C0-71DCE27D9230}" srcOrd="0" destOrd="0" presId="urn:microsoft.com/office/officeart/2008/layout/LinedList"/>
     <dgm:cxn modelId="{B420CE38-4264-4DFC-8589-1CF9D71A3504}" type="presOf" srcId="{96536070-1628-4716-97C2-CEC114DEB539}" destId="{A28EABA6-AA01-47E7-B080-AEB024760DC4}" srcOrd="0" destOrd="0" presId="urn:microsoft.com/office/officeart/2008/layout/LinedList"/>
     <dgm:cxn modelId="{3D6E6E66-DFD4-43FA-A07B-FBD26697B4B5}" type="presOf" srcId="{6706C9B2-0538-4EA4-991D-1FB2182780DB}" destId="{7129A45C-BCD2-440D-8B93-31CBE031D6E8}" srcOrd="0" destOrd="0" presId="urn:microsoft.com/office/officeart/2008/layout/LinedList"/>
     <dgm:cxn modelId="{5D80FC67-8E12-4BA4-80E8-09723238D76A}" type="presOf" srcId="{24A68024-527F-4F3F-8B9C-B8D92432D1D6}" destId="{1788E2B6-DB17-4988-A134-2185D9740257}" srcOrd="0" destOrd="0" presId="urn:microsoft.com/office/officeart/2008/layout/LinedList"/>
@@ -6057,12 +6050,18 @@
     <dgm:cxn modelId="{C936A31C-326E-4EE1-A19E-837804CD1196}" type="presParOf" srcId="{DF708D14-221D-44B7-B35A-116EE0A17361}" destId="{8188D5FE-7AFC-4805-8891-310A8BB78498}" srcOrd="2" destOrd="0" presId="urn:microsoft.com/office/officeart/2008/layout/LinedList"/>
     <dgm:cxn modelId="{98E5D394-0D8A-4E30-8D3E-6FB022F26CF9}" type="presParOf" srcId="{EDB2617B-4BAF-4115-91A3-3B53D772F336}" destId="{F5238EE6-7B59-47A2-B9A7-A62858BD7C7F}" srcOrd="8" destOrd="0" presId="urn:microsoft.com/office/officeart/2008/layout/LinedList"/>
     <dgm:cxn modelId="{899AD7D4-21B6-490E-9771-4FBF6F11BA15}" type="presParOf" srcId="{EDB2617B-4BAF-4115-91A3-3B53D772F336}" destId="{3058AACB-B9A2-4F6C-8470-72051CCE5202}" srcOrd="9" destOrd="0" presId="urn:microsoft.com/office/officeart/2008/layout/LinedList"/>
+    <dgm:cxn modelId="{53715682-B0F8-4235-B433-2802856D0A50}" type="presParOf" srcId="{EDB2617B-4BAF-4115-91A3-3B53D772F336}" destId="{67B4E9A2-5DDD-4102-BC74-E853574430C7}" srcOrd="10" destOrd="0" presId="urn:microsoft.com/office/officeart/2008/layout/LinedList"/>
+    <dgm:cxn modelId="{A36B4231-CB66-49E4-AE58-68A84481D965}" type="presParOf" srcId="{67B4E9A2-5DDD-4102-BC74-E853574430C7}" destId="{97C0884A-DC70-43BD-8B8D-F38E88118A9C}" srcOrd="0" destOrd="0" presId="urn:microsoft.com/office/officeart/2008/layout/LinedList"/>
+    <dgm:cxn modelId="{DC83BA0D-12F1-4218-9326-7149574DE6B6}" type="presParOf" srcId="{67B4E9A2-5DDD-4102-BC74-E853574430C7}" destId="{6BEA1EB0-BDDF-4B8F-93C0-71DCE27D9230}" srcOrd="1" destOrd="0" presId="urn:microsoft.com/office/officeart/2008/layout/LinedList"/>
+    <dgm:cxn modelId="{ED4BF20D-256B-4568-B79E-98F1A046D5CD}" type="presParOf" srcId="{67B4E9A2-5DDD-4102-BC74-E853574430C7}" destId="{218A786B-2A4E-4921-9ABE-712747D2584E}" srcOrd="2" destOrd="0" presId="urn:microsoft.com/office/officeart/2008/layout/LinedList"/>
+    <dgm:cxn modelId="{7C0ECAAF-EE95-4A77-ACCA-0A8E6ECC4FE1}" type="presParOf" srcId="{EDB2617B-4BAF-4115-91A3-3B53D772F336}" destId="{AC8E75E8-D438-48A1-A8B0-9CB830056921}" srcOrd="11" destOrd="0" presId="urn:microsoft.com/office/officeart/2008/layout/LinedList"/>
+    <dgm:cxn modelId="{566B29FE-D388-4AB9-BD21-51FAFDF59950}" type="presParOf" srcId="{EDB2617B-4BAF-4115-91A3-3B53D772F336}" destId="{4EA91243-ECAF-419C-99B8-F664B383E784}" srcOrd="12" destOrd="0" presId="urn:microsoft.com/office/officeart/2008/layout/LinedList"/>
   </dgm:cxnLst>
   <dgm:bg/>
   <dgm:whole/>
   <dgm:extLst>
     <a:ext uri="http://schemas.microsoft.com/office/drawing/2008/diagram">
-      <dsp:dataModelExt xmlns:dsp="http://schemas.microsoft.com/office/drawing/2008/diagram" relId="rId6" minVer="http://schemas.openxmlformats.org/drawingml/2006/diagram"/>
+      <dsp:dataModelExt xmlns:dsp="http://schemas.microsoft.com/office/drawing/2008/diagram" relId="rId7" minVer="http://schemas.openxmlformats.org/drawingml/2006/diagram"/>
     </a:ext>
   </dgm:extLst>
 </dgm:dataModel>
@@ -6623,7 +6622,7 @@
   <dgm:whole/>
   <dgm:extLst>
     <a:ext uri="http://schemas.microsoft.com/office/drawing/2008/diagram">
-      <dsp:dataModelExt xmlns:dsp="http://schemas.microsoft.com/office/drawing/2008/diagram" relId="rId6" minVer="http://schemas.openxmlformats.org/drawingml/2006/diagram"/>
+      <dsp:dataModelExt xmlns:dsp="http://schemas.microsoft.com/office/drawing/2008/diagram" relId="rId7" minVer="http://schemas.openxmlformats.org/drawingml/2006/diagram"/>
     </a:ext>
   </dgm:extLst>
 </dgm:dataModel>
@@ -6846,7 +6845,7 @@
   <dgm:whole/>
   <dgm:extLst>
     <a:ext uri="http://schemas.microsoft.com/office/drawing/2008/diagram">
-      <dsp:dataModelExt xmlns:dsp="http://schemas.microsoft.com/office/drawing/2008/diagram" relId="rId6" minVer="http://schemas.openxmlformats.org/drawingml/2006/diagram"/>
+      <dsp:dataModelExt xmlns:dsp="http://schemas.microsoft.com/office/drawing/2008/diagram" relId="rId7" minVer="http://schemas.openxmlformats.org/drawingml/2006/diagram"/>
     </a:ext>
   </dgm:extLst>
 </dgm:dataModel>
@@ -7305,7 +7304,7 @@
       </dsp:nvSpPr>
       <dsp:spPr>
         <a:xfrm>
-          <a:off x="0" y="2158"/>
+          <a:off x="0" y="0"/>
           <a:ext cx="6492240" cy="0"/>
         </a:xfrm>
         <a:prstGeom prst="line">
@@ -7354,8 +7353,8 @@
       </dsp:nvSpPr>
       <dsp:spPr>
         <a:xfrm>
-          <a:off x="0" y="2158"/>
-          <a:ext cx="1757078" cy="4416371"/>
+          <a:off x="0" y="0"/>
+          <a:ext cx="1757078" cy="4420689"/>
         </a:xfrm>
         <a:prstGeom prst="rect">
           <a:avLst/>
@@ -7409,8 +7408,8 @@
         </a:p>
       </dsp:txBody>
       <dsp:txXfrm>
-        <a:off x="0" y="2158"/>
-        <a:ext cx="1757078" cy="4416371"/>
+        <a:off x="0" y="0"/>
+        <a:ext cx="1757078" cy="4420689"/>
       </dsp:txXfrm>
     </dsp:sp>
     <dsp:sp modelId="{9B9C5CE9-A737-42D6-AD71-55BC7C1FB9D7}">
@@ -7420,8 +7419,8 @@
       </dsp:nvSpPr>
       <dsp:spPr>
         <a:xfrm>
-          <a:off x="1845807" y="71164"/>
-          <a:ext cx="4643504" cy="1380116"/>
+          <a:off x="1845807" y="102746"/>
+          <a:ext cx="4643504" cy="2054929"/>
         </a:xfrm>
         <a:prstGeom prst="rect">
           <a:avLst/>
@@ -7469,8 +7468,8 @@
         </a:p>
       </dsp:txBody>
       <dsp:txXfrm>
-        <a:off x="1845807" y="71164"/>
-        <a:ext cx="4643504" cy="1380116"/>
+        <a:off x="1845807" y="102746"/>
+        <a:ext cx="4643504" cy="2054929"/>
       </dsp:txXfrm>
     </dsp:sp>
     <dsp:sp modelId="{E0F7F51D-90F0-44AA-99A7-5B8B2447EC79}">
@@ -7480,7 +7479,7 @@
       </dsp:nvSpPr>
       <dsp:spPr>
         <a:xfrm>
-          <a:off x="1757078" y="1451280"/>
+          <a:off x="1757078" y="2157676"/>
           <a:ext cx="4732234" cy="0"/>
         </a:xfrm>
         <a:prstGeom prst="line">
@@ -7528,8 +7527,8 @@
       </dsp:nvSpPr>
       <dsp:spPr>
         <a:xfrm>
-          <a:off x="1845807" y="1520286"/>
-          <a:ext cx="4643504" cy="1380116"/>
+          <a:off x="1845807" y="2260422"/>
+          <a:ext cx="4643504" cy="2054929"/>
         </a:xfrm>
         <a:prstGeom prst="rect">
           <a:avLst/>
@@ -7572,13 +7571,13 @@
           </a:pPr>
           <a:r>
             <a:rPr lang="pt-PT" sz="1800" kern="1200" dirty="0"/>
-            <a:t>Para facilitar o acompanhamento dos funcionários, a empresa deseja ainda que seja desenvolvida uma aplicação móvel.</a:t>
+            <a:t>Para facilitar o acompanhamento dos funcionários, esta plataforma deverá possuir uma zona restrita a estes, e cujo objetivo é a gestão dos serviços.</a:t>
           </a:r>
         </a:p>
       </dsp:txBody>
       <dsp:txXfrm>
-        <a:off x="1845807" y="1520286"/>
-        <a:ext cx="4643504" cy="1380116"/>
+        <a:off x="1845807" y="2260422"/>
+        <a:ext cx="4643504" cy="2054929"/>
       </dsp:txXfrm>
     </dsp:sp>
     <dsp:sp modelId="{321CB34B-7F12-47BE-ADEA-38D180AD3111}">
@@ -7588,115 +7587,7 @@
       </dsp:nvSpPr>
       <dsp:spPr>
         <a:xfrm>
-          <a:off x="1757078" y="2900402"/>
-          <a:ext cx="4732234" cy="0"/>
-        </a:xfrm>
-        <a:prstGeom prst="line">
-          <a:avLst/>
-        </a:prstGeom>
-        <a:solidFill>
-          <a:schemeClr val="accent1">
-            <a:hueOff val="0"/>
-            <a:satOff val="0"/>
-            <a:lumOff val="0"/>
-            <a:alphaOff val="0"/>
-          </a:schemeClr>
-        </a:solidFill>
-        <a:ln w="15875" cap="flat" cmpd="sng" algn="ctr">
-          <a:solidFill>
-            <a:schemeClr val="accent1">
-              <a:tint val="50000"/>
-              <a:hueOff val="0"/>
-              <a:satOff val="0"/>
-              <a:lumOff val="0"/>
-              <a:alphaOff val="0"/>
-            </a:schemeClr>
-          </a:solidFill>
-          <a:prstDash val="solid"/>
-        </a:ln>
-        <a:effectLst/>
-      </dsp:spPr>
-      <dsp:style>
-        <a:lnRef idx="2">
-          <a:scrgbClr r="0" g="0" b="0"/>
-        </a:lnRef>
-        <a:fillRef idx="1">
-          <a:scrgbClr r="0" g="0" b="0"/>
-        </a:fillRef>
-        <a:effectRef idx="0">
-          <a:scrgbClr r="0" g="0" b="0"/>
-        </a:effectRef>
-        <a:fontRef idx="minor"/>
-      </dsp:style>
-    </dsp:sp>
-    <dsp:sp modelId="{1B4CB856-EB8A-4818-B7FD-0A1EE3621FAA}">
-      <dsp:nvSpPr>
-        <dsp:cNvPr id="0" name=""/>
-        <dsp:cNvSpPr/>
-      </dsp:nvSpPr>
-      <dsp:spPr>
-        <a:xfrm>
-          <a:off x="1845807" y="2969408"/>
-          <a:ext cx="4643504" cy="1380116"/>
-        </a:xfrm>
-        <a:prstGeom prst="rect">
-          <a:avLst/>
-        </a:prstGeom>
-        <a:noFill/>
-        <a:ln>
-          <a:noFill/>
-        </a:ln>
-        <a:effectLst/>
-      </dsp:spPr>
-      <dsp:style>
-        <a:lnRef idx="0">
-          <a:scrgbClr r="0" g="0" b="0"/>
-        </a:lnRef>
-        <a:fillRef idx="0">
-          <a:scrgbClr r="0" g="0" b="0"/>
-        </a:fillRef>
-        <a:effectRef idx="0">
-          <a:scrgbClr r="0" g="0" b="0"/>
-        </a:effectRef>
-        <a:fontRef idx="minor"/>
-      </dsp:style>
-      <dsp:txBody>
-        <a:bodyPr spcFirstLastPara="0" vert="horz" wrap="square" lIns="68580" tIns="68580" rIns="68580" bIns="68580" numCol="1" spcCol="1270" anchor="t" anchorCtr="0">
-          <a:noAutofit/>
-        </a:bodyPr>
-        <a:lstStyle/>
-        <a:p>
-          <a:pPr marL="0" lvl="0" indent="0" algn="just" defTabSz="800100">
-            <a:lnSpc>
-              <a:spcPct val="90000"/>
-            </a:lnSpc>
-            <a:spcBef>
-              <a:spcPct val="0"/>
-            </a:spcBef>
-            <a:spcAft>
-              <a:spcPct val="35000"/>
-            </a:spcAft>
-            <a:buNone/>
-          </a:pPr>
-          <a:r>
-            <a:rPr lang="pt-PT" sz="1800" kern="1200" dirty="0"/>
-            <a:t>O pagamento do serviço é cobrado no destino e a emissão da fatura é feita via Email e o envio da sua referência via SMS.</a:t>
-          </a:r>
-        </a:p>
-      </dsp:txBody>
-      <dsp:txXfrm>
-        <a:off x="1845807" y="2969408"/>
-        <a:ext cx="4643504" cy="1380116"/>
-      </dsp:txXfrm>
-    </dsp:sp>
-    <dsp:sp modelId="{9F25DF1D-C662-4F54-8A6B-5C11162BAFF4}">
-      <dsp:nvSpPr>
-        <dsp:cNvPr id="0" name=""/>
-        <dsp:cNvSpPr/>
-      </dsp:nvSpPr>
-      <dsp:spPr>
-        <a:xfrm>
-          <a:off x="1757078" y="4349524"/>
+          <a:off x="1757078" y="4315352"/>
           <a:ext cx="4732234" cy="0"/>
         </a:xfrm>
         <a:prstGeom prst="line">
@@ -8357,7 +8248,7 @@
           </a:pPr>
           <a:r>
             <a:rPr lang="pt-PT" sz="2400" kern="1200" dirty="0"/>
-            <a:t>Cliente poderia, na conveniência e comodidade da sua casa, requisitar e usufruir dos serviços da </a:t>
+            <a:t>Cliente poderá, na conveniência e comodidade da sua casa, requisitar e usufruir dos serviços da </a:t>
           </a:r>
           <a:r>
             <a:rPr lang="pt-PT" sz="2400" i="1" kern="1200" dirty="0"/>
@@ -8538,8 +8429,8 @@
       </dsp:nvSpPr>
       <dsp:spPr>
         <a:xfrm>
-          <a:off x="1395968" y="2669976"/>
-          <a:ext cx="5096906" cy="821531"/>
+          <a:off x="1395968" y="2659803"/>
+          <a:ext cx="5096906" cy="618073"/>
         </a:xfrm>
         <a:prstGeom prst="rect">
           <a:avLst/>
@@ -8587,8 +8478,8 @@
         </a:p>
       </dsp:txBody>
       <dsp:txXfrm>
-        <a:off x="1395968" y="2669976"/>
-        <a:ext cx="5096906" cy="821531"/>
+        <a:off x="1395968" y="2659803"/>
+        <a:ext cx="5096906" cy="618073"/>
       </dsp:txXfrm>
     </dsp:sp>
     <dsp:sp modelId="{D174253D-7B14-411B-B41B-255809F7683E}">
@@ -8598,7 +8489,7 @@
       </dsp:nvSpPr>
       <dsp:spPr>
         <a:xfrm>
-          <a:off x="1298574" y="3491507"/>
+          <a:off x="1298574" y="3277877"/>
           <a:ext cx="5194300" cy="0"/>
         </a:xfrm>
         <a:prstGeom prst="line">
@@ -8646,8 +8537,8 @@
       </dsp:nvSpPr>
       <dsp:spPr>
         <a:xfrm>
-          <a:off x="1395968" y="3532584"/>
-          <a:ext cx="5096906" cy="821531"/>
+          <a:off x="1395968" y="3308781"/>
+          <a:ext cx="5096906" cy="618073"/>
         </a:xfrm>
         <a:prstGeom prst="rect">
           <a:avLst/>
@@ -8695,8 +8586,8 @@
         </a:p>
       </dsp:txBody>
       <dsp:txXfrm>
-        <a:off x="1395968" y="3532584"/>
-        <a:ext cx="5096906" cy="821531"/>
+        <a:off x="1395968" y="3308781"/>
+        <a:ext cx="5096906" cy="618073"/>
       </dsp:txXfrm>
     </dsp:sp>
     <dsp:sp modelId="{DDBACBE5-46EE-47BD-AB63-C6419C074411}">
@@ -8706,7 +8597,7 @@
       </dsp:nvSpPr>
       <dsp:spPr>
         <a:xfrm>
-          <a:off x="1298574" y="4354115"/>
+          <a:off x="1298574" y="3926855"/>
           <a:ext cx="5194300" cy="0"/>
         </a:xfrm>
         <a:prstGeom prst="line">
@@ -8754,8 +8645,8 @@
       </dsp:nvSpPr>
       <dsp:spPr>
         <a:xfrm>
-          <a:off x="1395968" y="4395192"/>
-          <a:ext cx="5096906" cy="821531"/>
+          <a:off x="1395968" y="3957758"/>
+          <a:ext cx="5096906" cy="618073"/>
         </a:xfrm>
         <a:prstGeom prst="rect">
           <a:avLst/>
@@ -8803,8 +8694,8 @@
         </a:p>
       </dsp:txBody>
       <dsp:txXfrm>
-        <a:off x="1395968" y="4395192"/>
-        <a:ext cx="5096906" cy="821531"/>
+        <a:off x="1395968" y="3957758"/>
+        <a:ext cx="5096906" cy="618073"/>
       </dsp:txXfrm>
     </dsp:sp>
     <dsp:sp modelId="{F5238EE6-7B59-47A2-B9A7-A62858BD7C7F}">
@@ -8814,7 +8705,115 @@
       </dsp:nvSpPr>
       <dsp:spPr>
         <a:xfrm>
-          <a:off x="1298574" y="5216723"/>
+          <a:off x="1298574" y="4575832"/>
+          <a:ext cx="5194300" cy="0"/>
+        </a:xfrm>
+        <a:prstGeom prst="line">
+          <a:avLst/>
+        </a:prstGeom>
+        <a:solidFill>
+          <a:schemeClr val="accent2">
+            <a:hueOff val="0"/>
+            <a:satOff val="0"/>
+            <a:lumOff val="0"/>
+            <a:alphaOff val="0"/>
+          </a:schemeClr>
+        </a:solidFill>
+        <a:ln w="15875" cap="flat" cmpd="sng" algn="ctr">
+          <a:solidFill>
+            <a:schemeClr val="accent2">
+              <a:tint val="50000"/>
+              <a:hueOff val="0"/>
+              <a:satOff val="0"/>
+              <a:lumOff val="0"/>
+              <a:alphaOff val="0"/>
+            </a:schemeClr>
+          </a:solidFill>
+          <a:prstDash val="solid"/>
+        </a:ln>
+        <a:effectLst/>
+      </dsp:spPr>
+      <dsp:style>
+        <a:lnRef idx="2">
+          <a:scrgbClr r="0" g="0" b="0"/>
+        </a:lnRef>
+        <a:fillRef idx="1">
+          <a:scrgbClr r="0" g="0" b="0"/>
+        </a:fillRef>
+        <a:effectRef idx="0">
+          <a:scrgbClr r="0" g="0" b="0"/>
+        </a:effectRef>
+        <a:fontRef idx="minor"/>
+      </dsp:style>
+    </dsp:sp>
+    <dsp:sp modelId="{6BEA1EB0-BDDF-4B8F-93C0-71DCE27D9230}">
+      <dsp:nvSpPr>
+        <dsp:cNvPr id="0" name=""/>
+        <dsp:cNvSpPr/>
+      </dsp:nvSpPr>
+      <dsp:spPr>
+        <a:xfrm>
+          <a:off x="1395968" y="4606736"/>
+          <a:ext cx="5096906" cy="618073"/>
+        </a:xfrm>
+        <a:prstGeom prst="rect">
+          <a:avLst/>
+        </a:prstGeom>
+        <a:noFill/>
+        <a:ln>
+          <a:noFill/>
+        </a:ln>
+        <a:effectLst/>
+      </dsp:spPr>
+      <dsp:style>
+        <a:lnRef idx="0">
+          <a:scrgbClr r="0" g="0" b="0"/>
+        </a:lnRef>
+        <a:fillRef idx="0">
+          <a:scrgbClr r="0" g="0" b="0"/>
+        </a:fillRef>
+        <a:effectRef idx="0">
+          <a:scrgbClr r="0" g="0" b="0"/>
+        </a:effectRef>
+        <a:fontRef idx="minor"/>
+      </dsp:style>
+      <dsp:txBody>
+        <a:bodyPr spcFirstLastPara="0" vert="horz" wrap="square" lIns="91440" tIns="91440" rIns="91440" bIns="91440" numCol="1" spcCol="1270" anchor="t" anchorCtr="0">
+          <a:noAutofit/>
+        </a:bodyPr>
+        <a:lstStyle/>
+        <a:p>
+          <a:pPr marL="0" lvl="0" indent="0" algn="l" defTabSz="1066800">
+            <a:lnSpc>
+              <a:spcPct val="90000"/>
+            </a:lnSpc>
+            <a:spcBef>
+              <a:spcPct val="0"/>
+            </a:spcBef>
+            <a:spcAft>
+              <a:spcPct val="35000"/>
+            </a:spcAft>
+            <a:buNone/>
+          </a:pPr>
+          <a:r>
+            <a:rPr lang="pt-PT" sz="2400" kern="1200" dirty="0"/>
+            <a:t>…</a:t>
+          </a:r>
+        </a:p>
+      </dsp:txBody>
+      <dsp:txXfrm>
+        <a:off x="1395968" y="4606736"/>
+        <a:ext cx="5096906" cy="618073"/>
+      </dsp:txXfrm>
+    </dsp:sp>
+    <dsp:sp modelId="{AC8E75E8-D438-48A1-A8B0-9CB830056921}">
+      <dsp:nvSpPr>
+        <dsp:cNvPr id="0" name=""/>
+        <dsp:cNvSpPr/>
+      </dsp:nvSpPr>
+      <dsp:spPr>
+        <a:xfrm>
+          <a:off x="1298574" y="5224810"/>
           <a:ext cx="5194300" cy="0"/>
         </a:xfrm>
         <a:prstGeom prst="line">
@@ -19753,6 +19752,214 @@
           <a:bodyPr/>
           <a:lstStyle/>
           <a:p>
+            <a:r>
+              <a:rPr lang="pt-PT" dirty="0"/>
+              <a:t>Numa sociedade que vive constantemente sob grande stress causado por um ritmo de vida acelerado e agitado cada vez mais são as evidencias deste estilo de vida na saúde das pessoas, sendo que quer as crianças quer os adultos desenvolvem cada vez mais cedo problemas de saúde relacionados quer com o sedentarismo, com a dependência de tecnologias e com todo o stress fruto do seu dia-a-dia.</a:t>
+            </a:r>
+          </a:p>
+          <a:p>
+            <a:r>
+              <a:rPr lang="pt-PT" dirty="0"/>
+              <a:t>Isto abre caminho para que empresas na área da saúde possam aproveitar estas situações para inovar os seus negócios e oferecer serviços que promovem estilos de vida mais saudáveis.</a:t>
+            </a:r>
+          </a:p>
+          <a:p>
+            <a:r>
+              <a:rPr lang="pt-PT" dirty="0"/>
+              <a:t>Este foi o caso da empresa Zen+, que possuindo vários centros de massagens na zona de braga, decidiu colocar ao dispor dos seus clientes um novo serviço de massagens ao domicilio.</a:t>
+            </a:r>
+          </a:p>
+        </p:txBody>
+      </p:sp>
+      <p:sp>
+        <p:nvSpPr>
+          <p:cNvPr id="4" name="Marcador de Posição do Número do Diapositivo 3"/>
+          <p:cNvSpPr>
+            <a:spLocks noGrp="1"/>
+          </p:cNvSpPr>
+          <p:nvPr>
+            <p:ph type="sldNum" sz="quarter" idx="10"/>
+          </p:nvPr>
+        </p:nvSpPr>
+        <p:spPr/>
+        <p:txBody>
+          <a:bodyPr/>
+          <a:lstStyle/>
+          <a:p>
+            <a:fld id="{071F3FBA-D23A-4285-A104-7C7E32F747DD}" type="slidenum">
+              <a:rPr lang="pt-PT" smtClean="0"/>
+              <a:t>3</a:t>
+            </a:fld>
+            <a:endParaRPr lang="pt-PT"/>
+          </a:p>
+        </p:txBody>
+      </p:sp>
+    </p:spTree>
+    <p:extLst>
+      <p:ext uri="{BB962C8B-B14F-4D97-AF65-F5344CB8AC3E}">
+        <p14:creationId xmlns:p14="http://schemas.microsoft.com/office/powerpoint/2010/main" val="2022997319"/>
+      </p:ext>
+    </p:extLst>
+  </p:cSld>
+  <p:clrMapOvr>
+    <a:masterClrMapping/>
+  </p:clrMapOvr>
+</p:notes>
+</file>
+
+<file path=ppt/notesSlides/notesSlide2.xml><?xml version="1.0" encoding="utf-8"?>
+<p:notes xmlns:a="http://schemas.openxmlformats.org/drawingml/2006/main" xmlns:r="http://schemas.openxmlformats.org/officeDocument/2006/relationships" xmlns:p="http://schemas.openxmlformats.org/presentationml/2006/main">
+  <p:cSld>
+    <p:spTree>
+      <p:nvGrpSpPr>
+        <p:cNvPr id="1" name=""/>
+        <p:cNvGrpSpPr/>
+        <p:nvPr/>
+      </p:nvGrpSpPr>
+      <p:grpSpPr>
+        <a:xfrm>
+          <a:off x="0" y="0"/>
+          <a:ext cx="0" cy="0"/>
+          <a:chOff x="0" y="0"/>
+          <a:chExt cx="0" cy="0"/>
+        </a:xfrm>
+      </p:grpSpPr>
+      <p:sp>
+        <p:nvSpPr>
+          <p:cNvPr id="2" name="Marcador de Posição da Imagem do Diapositivo 1"/>
+          <p:cNvSpPr>
+            <a:spLocks noGrp="1" noRot="1" noChangeAspect="1"/>
+          </p:cNvSpPr>
+          <p:nvPr>
+            <p:ph type="sldImg"/>
+          </p:nvPr>
+        </p:nvSpPr>
+        <p:spPr/>
+      </p:sp>
+      <p:sp>
+        <p:nvSpPr>
+          <p:cNvPr id="3" name="Marcador de Posição de Notas 2"/>
+          <p:cNvSpPr>
+            <a:spLocks noGrp="1"/>
+          </p:cNvSpPr>
+          <p:nvPr>
+            <p:ph type="body" idx="1"/>
+          </p:nvPr>
+        </p:nvSpPr>
+        <p:spPr/>
+        <p:txBody>
+          <a:bodyPr/>
+          <a:lstStyle/>
+          <a:p>
+            <a:r>
+              <a:rPr lang="pt-PT" dirty="0"/>
+              <a:t>De forma a promover este novo serviço, ao qual chamou “</a:t>
+            </a:r>
+            <a:r>
+              <a:rPr lang="pt-PT" dirty="0" err="1"/>
+              <a:t>home</a:t>
+            </a:r>
+            <a:r>
+              <a:rPr lang="pt-PT" dirty="0"/>
+              <a:t> </a:t>
+            </a:r>
+            <a:r>
+              <a:rPr lang="pt-PT" dirty="0" err="1"/>
+              <a:t>massage</a:t>
+            </a:r>
+            <a:r>
+              <a:rPr lang="pt-PT" dirty="0"/>
+              <a:t>”, apostou na criação de uma plataforma web que lhe permitirá não só dar a conhecer aos seus clientes os serviços que disponibiliza, mas também permite a sua requisição na comodidade das suas casas, evitando assim o desconforto das deslocações a um dos vários centros existentes na cidade.</a:t>
+            </a:r>
+          </a:p>
+          <a:p>
+            <a:r>
+              <a:rPr lang="pt-PT" dirty="0"/>
+              <a:t>Esta plataforma web deverá ser utilizada quer pelos clientes, para consulta e requisição dos serviços, quer pelos funcionários para terem acesso a informações sobre os serviços a prestar.</a:t>
+            </a:r>
+          </a:p>
+        </p:txBody>
+      </p:sp>
+      <p:sp>
+        <p:nvSpPr>
+          <p:cNvPr id="4" name="Marcador de Posição do Número do Diapositivo 3"/>
+          <p:cNvSpPr>
+            <a:spLocks noGrp="1"/>
+          </p:cNvSpPr>
+          <p:nvPr>
+            <p:ph type="sldNum" sz="quarter" idx="10"/>
+          </p:nvPr>
+        </p:nvSpPr>
+        <p:spPr/>
+        <p:txBody>
+          <a:bodyPr/>
+          <a:lstStyle/>
+          <a:p>
+            <a:fld id="{071F3FBA-D23A-4285-A104-7C7E32F747DD}" type="slidenum">
+              <a:rPr lang="pt-PT" smtClean="0"/>
+              <a:t>4</a:t>
+            </a:fld>
+            <a:endParaRPr lang="pt-PT"/>
+          </a:p>
+        </p:txBody>
+      </p:sp>
+    </p:spTree>
+    <p:extLst>
+      <p:ext uri="{BB962C8B-B14F-4D97-AF65-F5344CB8AC3E}">
+        <p14:creationId xmlns:p14="http://schemas.microsoft.com/office/powerpoint/2010/main" val="3179536944"/>
+      </p:ext>
+    </p:extLst>
+  </p:cSld>
+  <p:clrMapOvr>
+    <a:masterClrMapping/>
+  </p:clrMapOvr>
+</p:notes>
+</file>
+
+<file path=ppt/notesSlides/notesSlide3.xml><?xml version="1.0" encoding="utf-8"?>
+<p:notes xmlns:a="http://schemas.openxmlformats.org/drawingml/2006/main" xmlns:r="http://schemas.openxmlformats.org/officeDocument/2006/relationships" xmlns:p="http://schemas.openxmlformats.org/presentationml/2006/main">
+  <p:cSld>
+    <p:spTree>
+      <p:nvGrpSpPr>
+        <p:cNvPr id="1" name=""/>
+        <p:cNvGrpSpPr/>
+        <p:nvPr/>
+      </p:nvGrpSpPr>
+      <p:grpSpPr>
+        <a:xfrm>
+          <a:off x="0" y="0"/>
+          <a:ext cx="0" cy="0"/>
+          <a:chOff x="0" y="0"/>
+          <a:chExt cx="0" cy="0"/>
+        </a:xfrm>
+      </p:grpSpPr>
+      <p:sp>
+        <p:nvSpPr>
+          <p:cNvPr id="2" name="Marcador de Posição da Imagem do Diapositivo 1"/>
+          <p:cNvSpPr>
+            <a:spLocks noGrp="1" noRot="1" noChangeAspect="1"/>
+          </p:cNvSpPr>
+          <p:nvPr>
+            <p:ph type="sldImg"/>
+          </p:nvPr>
+        </p:nvSpPr>
+        <p:spPr/>
+      </p:sp>
+      <p:sp>
+        <p:nvSpPr>
+          <p:cNvPr id="3" name="Marcador de Posição de Notas 2"/>
+          <p:cNvSpPr>
+            <a:spLocks noGrp="1"/>
+          </p:cNvSpPr>
+          <p:nvPr>
+            <p:ph type="body" idx="1"/>
+          </p:nvPr>
+        </p:nvSpPr>
+        <p:spPr/>
+        <p:txBody>
+          <a:bodyPr/>
+          <a:lstStyle/>
+          <a:p>
             <a:pPr algn="just"/>
             <a:r>
               <a:rPr lang="pt-PT" dirty="0"/>
@@ -19805,6 +20012,641 @@
     <p:extLst>
       <p:ext uri="{BB962C8B-B14F-4D97-AF65-F5344CB8AC3E}">
         <p14:creationId xmlns:p14="http://schemas.microsoft.com/office/powerpoint/2010/main" val="1400049177"/>
+      </p:ext>
+    </p:extLst>
+  </p:cSld>
+  <p:clrMapOvr>
+    <a:masterClrMapping/>
+  </p:clrMapOvr>
+</p:notes>
+</file>
+
+<file path=ppt/notesSlides/notesSlide4.xml><?xml version="1.0" encoding="utf-8"?>
+<p:notes xmlns:a="http://schemas.openxmlformats.org/drawingml/2006/main" xmlns:r="http://schemas.openxmlformats.org/officeDocument/2006/relationships" xmlns:p="http://schemas.openxmlformats.org/presentationml/2006/main">
+  <p:cSld>
+    <p:spTree>
+      <p:nvGrpSpPr>
+        <p:cNvPr id="1" name=""/>
+        <p:cNvGrpSpPr/>
+        <p:nvPr/>
+      </p:nvGrpSpPr>
+      <p:grpSpPr>
+        <a:xfrm>
+          <a:off x="0" y="0"/>
+          <a:ext cx="0" cy="0"/>
+          <a:chOff x="0" y="0"/>
+          <a:chExt cx="0" cy="0"/>
+        </a:xfrm>
+      </p:grpSpPr>
+      <p:sp>
+        <p:nvSpPr>
+          <p:cNvPr id="2" name="Marcador de Posição da Imagem do Diapositivo 1"/>
+          <p:cNvSpPr>
+            <a:spLocks noGrp="1" noRot="1" noChangeAspect="1"/>
+          </p:cNvSpPr>
+          <p:nvPr>
+            <p:ph type="sldImg"/>
+          </p:nvPr>
+        </p:nvSpPr>
+        <p:spPr/>
+      </p:sp>
+      <p:sp>
+        <p:nvSpPr>
+          <p:cNvPr id="3" name="Marcador de Posição de Notas 2"/>
+          <p:cNvSpPr>
+            <a:spLocks noGrp="1"/>
+          </p:cNvSpPr>
+          <p:nvPr>
+            <p:ph type="body" idx="1"/>
+          </p:nvPr>
+        </p:nvSpPr>
+        <p:spPr/>
+        <p:txBody>
+          <a:bodyPr/>
+          <a:lstStyle/>
+          <a:p>
+            <a:r>
+              <a:rPr lang="pt-PT" dirty="0"/>
+              <a:t>Um dos motivos que levou a zen+, a criação deste projeto foi o facto de este se apresentar como inovador na área em Portugal,  assim o cliente poderia na conveniência e comodidade de sua casa requisitar e usufruir dos seus serviços, o que se apresenta como bastante vantajoso no mercado atual</a:t>
+            </a:r>
+          </a:p>
+          <a:p>
+            <a:endParaRPr lang="pt-PT" dirty="0"/>
+          </a:p>
+          <a:p>
+            <a:r>
+              <a:rPr lang="pt-PT" dirty="0"/>
+              <a:t>Visto que as massagens são procuradas por um vasto leque de pessoas, desde desportistas á procura de relaxamento muscula e tratamento de </a:t>
+            </a:r>
+            <a:r>
+              <a:rPr lang="pt-PT" dirty="0" err="1"/>
+              <a:t>lesoesr</a:t>
+            </a:r>
+            <a:r>
+              <a:rPr lang="pt-PT" dirty="0"/>
+              <a:t>, idosos ,pessoas com problemas posturais até aqueles que o fazem por lazer, o publico alvo apresenta-se como sendo bastante abrangente, colocando o projeto numa boa posição para ser bem sucedido</a:t>
+            </a:r>
+          </a:p>
+        </p:txBody>
+      </p:sp>
+      <p:sp>
+        <p:nvSpPr>
+          <p:cNvPr id="4" name="Marcador de Posição do Número do Diapositivo 3"/>
+          <p:cNvSpPr>
+            <a:spLocks noGrp="1"/>
+          </p:cNvSpPr>
+          <p:nvPr>
+            <p:ph type="sldNum" sz="quarter" idx="10"/>
+          </p:nvPr>
+        </p:nvSpPr>
+        <p:spPr/>
+        <p:txBody>
+          <a:bodyPr/>
+          <a:lstStyle/>
+          <a:p>
+            <a:fld id="{071F3FBA-D23A-4285-A104-7C7E32F747DD}" type="slidenum">
+              <a:rPr lang="pt-PT" smtClean="0"/>
+              <a:t>7</a:t>
+            </a:fld>
+            <a:endParaRPr lang="pt-PT"/>
+          </a:p>
+        </p:txBody>
+      </p:sp>
+    </p:spTree>
+    <p:extLst>
+      <p:ext uri="{BB962C8B-B14F-4D97-AF65-F5344CB8AC3E}">
+        <p14:creationId xmlns:p14="http://schemas.microsoft.com/office/powerpoint/2010/main" val="901139338"/>
+      </p:ext>
+    </p:extLst>
+  </p:cSld>
+  <p:clrMapOvr>
+    <a:masterClrMapping/>
+  </p:clrMapOvr>
+</p:notes>
+</file>
+
+<file path=ppt/notesSlides/notesSlide5.xml><?xml version="1.0" encoding="utf-8"?>
+<p:notes xmlns:a="http://schemas.openxmlformats.org/drawingml/2006/main" xmlns:r="http://schemas.openxmlformats.org/officeDocument/2006/relationships" xmlns:p="http://schemas.openxmlformats.org/presentationml/2006/main">
+  <p:cSld>
+    <p:spTree>
+      <p:nvGrpSpPr>
+        <p:cNvPr id="1" name=""/>
+        <p:cNvGrpSpPr/>
+        <p:nvPr/>
+      </p:nvGrpSpPr>
+      <p:grpSpPr>
+        <a:xfrm>
+          <a:off x="0" y="0"/>
+          <a:ext cx="0" cy="0"/>
+          <a:chOff x="0" y="0"/>
+          <a:chExt cx="0" cy="0"/>
+        </a:xfrm>
+      </p:grpSpPr>
+      <p:sp>
+        <p:nvSpPr>
+          <p:cNvPr id="2" name="Marcador de Posição da Imagem do Diapositivo 1"/>
+          <p:cNvSpPr>
+            <a:spLocks noGrp="1" noRot="1" noChangeAspect="1"/>
+          </p:cNvSpPr>
+          <p:nvPr>
+            <p:ph type="sldImg"/>
+          </p:nvPr>
+        </p:nvSpPr>
+        <p:spPr/>
+      </p:sp>
+      <p:sp>
+        <p:nvSpPr>
+          <p:cNvPr id="3" name="Marcador de Posição de Notas 2"/>
+          <p:cNvSpPr>
+            <a:spLocks noGrp="1"/>
+          </p:cNvSpPr>
+          <p:nvPr>
+            <p:ph type="body" idx="1"/>
+          </p:nvPr>
+        </p:nvSpPr>
+        <p:spPr/>
+        <p:txBody>
+          <a:bodyPr/>
+          <a:lstStyle/>
+          <a:p>
+            <a:r>
+              <a:rPr lang="pt-PT" dirty="0"/>
+              <a:t>Códigos postais, mapas e localização – permitir validar as localizações indicadas pelos clientes e permitir aos funcionários obter </a:t>
+            </a:r>
+            <a:r>
+              <a:rPr lang="pt-PT" sz="1200" kern="1200" dirty="0">
+                <a:solidFill>
+                  <a:schemeClr val="tx1"/>
+                </a:solidFill>
+                <a:effectLst/>
+                <a:latin typeface="+mn-lt"/>
+                <a:ea typeface="+mn-ea"/>
+                <a:cs typeface="+mn-cs"/>
+              </a:rPr>
+              <a:t>direções até à casa dos clientes. </a:t>
+            </a:r>
+          </a:p>
+          <a:p>
+            <a:pPr marL="0" marR="0" lvl="0" indent="0" algn="l" defTabSz="914400" rtl="0" eaLnBrk="1" fontAlgn="auto" latinLnBrk="0" hangingPunct="1">
+              <a:lnSpc>
+                <a:spcPct val="100000"/>
+              </a:lnSpc>
+              <a:spcBef>
+                <a:spcPts val="0"/>
+              </a:spcBef>
+              <a:spcAft>
+                <a:spcPts val="0"/>
+              </a:spcAft>
+              <a:buClrTx/>
+              <a:buSzTx/>
+              <a:buFontTx/>
+              <a:buNone/>
+              <a:tabLst/>
+              <a:defRPr/>
+            </a:pPr>
+            <a:r>
+              <a:rPr lang="pt-PT" sz="1200" u="sng" kern="1200" dirty="0">
+                <a:solidFill>
+                  <a:schemeClr val="tx1"/>
+                </a:solidFill>
+                <a:effectLst/>
+                <a:latin typeface="+mn-lt"/>
+                <a:ea typeface="+mn-ea"/>
+                <a:cs typeface="+mn-cs"/>
+              </a:rPr>
+              <a:t>emails</a:t>
+            </a:r>
+            <a:r>
+              <a:rPr lang="pt-PT" sz="1200" kern="1200" dirty="0">
+                <a:solidFill>
+                  <a:schemeClr val="tx1"/>
+                </a:solidFill>
+                <a:effectLst/>
+                <a:latin typeface="+mn-lt"/>
+                <a:ea typeface="+mn-ea"/>
+                <a:cs typeface="+mn-cs"/>
+              </a:rPr>
+              <a:t>: permitirá o envio automático dos e-mails de confirmação de agendamento e de faturas relativas à realização do serviço. </a:t>
+            </a:r>
+          </a:p>
+          <a:p>
+            <a:pPr marL="0" marR="0" lvl="0" indent="0" algn="l" defTabSz="914400" rtl="0" eaLnBrk="1" fontAlgn="auto" latinLnBrk="0" hangingPunct="1">
+              <a:lnSpc>
+                <a:spcPct val="100000"/>
+              </a:lnSpc>
+              <a:spcBef>
+                <a:spcPts val="0"/>
+              </a:spcBef>
+              <a:spcAft>
+                <a:spcPts val="0"/>
+              </a:spcAft>
+              <a:buClrTx/>
+              <a:buSzTx/>
+              <a:buFontTx/>
+              <a:buNone/>
+              <a:tabLst/>
+              <a:defRPr/>
+            </a:pPr>
+            <a:r>
+              <a:rPr lang="pt-PT" sz="1200" u="sng" kern="1200" dirty="0">
+                <a:solidFill>
+                  <a:schemeClr val="tx1"/>
+                </a:solidFill>
+                <a:effectLst/>
+                <a:latin typeface="+mn-lt"/>
+                <a:ea typeface="+mn-ea"/>
+                <a:cs typeface="+mn-cs"/>
+              </a:rPr>
+              <a:t>dados</a:t>
+            </a:r>
+            <a:r>
+              <a:rPr lang="pt-PT" sz="1200" kern="1200" dirty="0">
+                <a:solidFill>
+                  <a:schemeClr val="tx1"/>
+                </a:solidFill>
+                <a:effectLst/>
+                <a:latin typeface="+mn-lt"/>
+                <a:ea typeface="+mn-ea"/>
+                <a:cs typeface="+mn-cs"/>
+              </a:rPr>
+              <a:t>: é fundamental existirem dados relativos aos diversos serviços prestados pela empresa de forma a apresenta-los de forma clara e percetível aos clientes. </a:t>
+            </a:r>
+          </a:p>
+          <a:p>
+            <a:pPr marL="0" marR="0" lvl="0" indent="0" algn="l" defTabSz="914400" rtl="0" eaLnBrk="1" fontAlgn="auto" latinLnBrk="0" hangingPunct="1">
+              <a:lnSpc>
+                <a:spcPct val="100000"/>
+              </a:lnSpc>
+              <a:spcBef>
+                <a:spcPts val="0"/>
+              </a:spcBef>
+              <a:spcAft>
+                <a:spcPts val="0"/>
+              </a:spcAft>
+              <a:buClrTx/>
+              <a:buSzTx/>
+              <a:buFontTx/>
+              <a:buNone/>
+              <a:tabLst/>
+              <a:defRPr/>
+            </a:pPr>
+            <a:r>
+              <a:rPr lang="pt-PT" sz="1200" kern="1200" dirty="0">
+                <a:solidFill>
+                  <a:schemeClr val="tx1"/>
+                </a:solidFill>
+                <a:effectLst/>
+                <a:latin typeface="+mn-lt"/>
+                <a:ea typeface="+mn-ea"/>
+                <a:cs typeface="+mn-cs"/>
+              </a:rPr>
+              <a:t>Camada de apresentação, negócio e dados – estas estão relacionadas com o modo como a plataforma foi idealizada, modelo 3 camadas.</a:t>
+            </a:r>
+          </a:p>
+          <a:p>
+            <a:pPr marL="0" marR="0" lvl="0" indent="0" algn="l" defTabSz="914400" rtl="0" eaLnBrk="1" fontAlgn="auto" latinLnBrk="0" hangingPunct="1">
+              <a:lnSpc>
+                <a:spcPct val="100000"/>
+              </a:lnSpc>
+              <a:spcBef>
+                <a:spcPts val="0"/>
+              </a:spcBef>
+              <a:spcAft>
+                <a:spcPts val="0"/>
+              </a:spcAft>
+              <a:buClrTx/>
+              <a:buSzTx/>
+              <a:buFontTx/>
+              <a:buNone/>
+              <a:tabLst/>
+              <a:defRPr/>
+            </a:pPr>
+            <a:r>
+              <a:rPr lang="pt-PT" sz="1200" kern="1200" dirty="0">
+                <a:solidFill>
+                  <a:schemeClr val="tx1"/>
+                </a:solidFill>
+                <a:effectLst/>
+                <a:latin typeface="+mn-lt"/>
+                <a:ea typeface="+mn-ea"/>
+                <a:cs typeface="+mn-cs"/>
+              </a:rPr>
+              <a:t>Equipa – capaz de utilizar várias ferramentas, comunicar com os outros elementos da equipa e cumprir tarefas.</a:t>
+            </a:r>
+          </a:p>
+          <a:p>
+            <a:endParaRPr lang="pt-PT" dirty="0"/>
+          </a:p>
+        </p:txBody>
+      </p:sp>
+      <p:sp>
+        <p:nvSpPr>
+          <p:cNvPr id="4" name="Marcador de Posição do Número do Diapositivo 3"/>
+          <p:cNvSpPr>
+            <a:spLocks noGrp="1"/>
+          </p:cNvSpPr>
+          <p:nvPr>
+            <p:ph type="sldNum" sz="quarter" idx="10"/>
+          </p:nvPr>
+        </p:nvSpPr>
+        <p:spPr/>
+        <p:txBody>
+          <a:bodyPr/>
+          <a:lstStyle/>
+          <a:p>
+            <a:fld id="{071F3FBA-D23A-4285-A104-7C7E32F747DD}" type="slidenum">
+              <a:rPr lang="pt-PT" smtClean="0"/>
+              <a:t>9</a:t>
+            </a:fld>
+            <a:endParaRPr lang="pt-PT"/>
+          </a:p>
+        </p:txBody>
+      </p:sp>
+    </p:spTree>
+    <p:extLst>
+      <p:ext uri="{BB962C8B-B14F-4D97-AF65-F5344CB8AC3E}">
+        <p14:creationId xmlns:p14="http://schemas.microsoft.com/office/powerpoint/2010/main" val="4185719936"/>
+      </p:ext>
+    </p:extLst>
+  </p:cSld>
+  <p:clrMapOvr>
+    <a:masterClrMapping/>
+  </p:clrMapOvr>
+</p:notes>
+</file>
+
+<file path=ppt/notesSlides/notesSlide6.xml><?xml version="1.0" encoding="utf-8"?>
+<p:notes xmlns:a="http://schemas.openxmlformats.org/drawingml/2006/main" xmlns:r="http://schemas.openxmlformats.org/officeDocument/2006/relationships" xmlns:p="http://schemas.openxmlformats.org/presentationml/2006/main">
+  <p:cSld>
+    <p:spTree>
+      <p:nvGrpSpPr>
+        <p:cNvPr id="1" name=""/>
+        <p:cNvGrpSpPr/>
+        <p:nvPr/>
+      </p:nvGrpSpPr>
+      <p:grpSpPr>
+        <a:xfrm>
+          <a:off x="0" y="0"/>
+          <a:ext cx="0" cy="0"/>
+          <a:chOff x="0" y="0"/>
+          <a:chExt cx="0" cy="0"/>
+        </a:xfrm>
+      </p:grpSpPr>
+      <p:sp>
+        <p:nvSpPr>
+          <p:cNvPr id="2" name="Marcador de Posição da Imagem do Diapositivo 1"/>
+          <p:cNvSpPr>
+            <a:spLocks noGrp="1" noRot="1" noChangeAspect="1"/>
+          </p:cNvSpPr>
+          <p:nvPr>
+            <p:ph type="sldImg"/>
+          </p:nvPr>
+        </p:nvSpPr>
+        <p:spPr/>
+      </p:sp>
+      <p:sp>
+        <p:nvSpPr>
+          <p:cNvPr id="3" name="Marcador de Posição de Notas 2"/>
+          <p:cNvSpPr>
+            <a:spLocks noGrp="1"/>
+          </p:cNvSpPr>
+          <p:nvPr>
+            <p:ph type="body" idx="1"/>
+          </p:nvPr>
+        </p:nvSpPr>
+        <p:spPr/>
+        <p:txBody>
+          <a:bodyPr/>
+          <a:lstStyle/>
+          <a:p>
+            <a:r>
+              <a:rPr lang="pt-PT" dirty="0"/>
+              <a:t>Tendo em conta os recursos anteriormente identificados foi possível elaborar a seguinte maqueta.</a:t>
+            </a:r>
+          </a:p>
+          <a:p>
+            <a:r>
+              <a:rPr lang="pt-PT" dirty="0"/>
+              <a:t>Os clientes tem contacto com a camada de apresentação, mais precisamente com o catalogo de massagens e os funcionários com o mapa de navegação.</a:t>
+            </a:r>
+          </a:p>
+          <a:p>
+            <a:r>
+              <a:rPr lang="pt-PT" dirty="0"/>
+              <a:t>Na camada de negocio, contamos com o gestor de utilizadores, massagens e marcações, bem como alguns </a:t>
+            </a:r>
+            <a:r>
+              <a:rPr lang="pt-PT" dirty="0" err="1"/>
+              <a:t>servicos</a:t>
+            </a:r>
+            <a:r>
+              <a:rPr lang="pt-PT" dirty="0"/>
+              <a:t> externos </a:t>
+            </a:r>
+          </a:p>
+          <a:p>
+            <a:r>
+              <a:rPr lang="pt-PT" dirty="0"/>
+              <a:t>Por fim, na camada de dados encontramos os dados dos utilizadores, das massagens e das </a:t>
+            </a:r>
+            <a:r>
+              <a:rPr lang="pt-PT" dirty="0" err="1"/>
+              <a:t>marcacoes</a:t>
+            </a:r>
+            <a:r>
+              <a:rPr lang="pt-PT" dirty="0"/>
+              <a:t>.</a:t>
+            </a:r>
+          </a:p>
+        </p:txBody>
+      </p:sp>
+      <p:sp>
+        <p:nvSpPr>
+          <p:cNvPr id="4" name="Marcador de Posição do Número do Diapositivo 3"/>
+          <p:cNvSpPr>
+            <a:spLocks noGrp="1"/>
+          </p:cNvSpPr>
+          <p:nvPr>
+            <p:ph type="sldNum" sz="quarter" idx="10"/>
+          </p:nvPr>
+        </p:nvSpPr>
+        <p:spPr/>
+        <p:txBody>
+          <a:bodyPr/>
+          <a:lstStyle/>
+          <a:p>
+            <a:fld id="{071F3FBA-D23A-4285-A104-7C7E32F747DD}" type="slidenum">
+              <a:rPr lang="pt-PT" smtClean="0"/>
+              <a:t>10</a:t>
+            </a:fld>
+            <a:endParaRPr lang="pt-PT"/>
+          </a:p>
+        </p:txBody>
+      </p:sp>
+    </p:spTree>
+    <p:extLst>
+      <p:ext uri="{BB962C8B-B14F-4D97-AF65-F5344CB8AC3E}">
+        <p14:creationId xmlns:p14="http://schemas.microsoft.com/office/powerpoint/2010/main" val="2171110876"/>
+      </p:ext>
+    </p:extLst>
+  </p:cSld>
+  <p:clrMapOvr>
+    <a:masterClrMapping/>
+  </p:clrMapOvr>
+</p:notes>
+</file>
+
+<file path=ppt/notesSlides/notesSlide7.xml><?xml version="1.0" encoding="utf-8"?>
+<p:notes xmlns:a="http://schemas.openxmlformats.org/drawingml/2006/main" xmlns:r="http://schemas.openxmlformats.org/officeDocument/2006/relationships" xmlns:p="http://schemas.openxmlformats.org/presentationml/2006/main">
+  <p:cSld>
+    <p:spTree>
+      <p:nvGrpSpPr>
+        <p:cNvPr id="1" name=""/>
+        <p:cNvGrpSpPr/>
+        <p:nvPr/>
+      </p:nvGrpSpPr>
+      <p:grpSpPr>
+        <a:xfrm>
+          <a:off x="0" y="0"/>
+          <a:ext cx="0" cy="0"/>
+          <a:chOff x="0" y="0"/>
+          <a:chExt cx="0" cy="0"/>
+        </a:xfrm>
+      </p:grpSpPr>
+      <p:sp>
+        <p:nvSpPr>
+          <p:cNvPr id="2" name="Marcador de Posição da Imagem do Diapositivo 1"/>
+          <p:cNvSpPr>
+            <a:spLocks noGrp="1" noRot="1" noChangeAspect="1"/>
+          </p:cNvSpPr>
+          <p:nvPr>
+            <p:ph type="sldImg"/>
+          </p:nvPr>
+        </p:nvSpPr>
+        <p:spPr/>
+      </p:sp>
+      <p:sp>
+        <p:nvSpPr>
+          <p:cNvPr id="3" name="Marcador de Posição de Notas 2"/>
+          <p:cNvSpPr>
+            <a:spLocks noGrp="1"/>
+          </p:cNvSpPr>
+          <p:nvPr>
+            <p:ph type="body" idx="1"/>
+          </p:nvPr>
+        </p:nvSpPr>
+        <p:spPr/>
+        <p:txBody>
+          <a:bodyPr/>
+          <a:lstStyle/>
+          <a:p>
+            <a:pPr marL="0" marR="0" lvl="0" indent="0" algn="l" defTabSz="914400" rtl="0" eaLnBrk="1" fontAlgn="auto" latinLnBrk="0" hangingPunct="1">
+              <a:lnSpc>
+                <a:spcPct val="100000"/>
+              </a:lnSpc>
+              <a:spcBef>
+                <a:spcPts val="0"/>
+              </a:spcBef>
+              <a:spcAft>
+                <a:spcPts val="0"/>
+              </a:spcAft>
+              <a:buClrTx/>
+              <a:buSzTx/>
+              <a:buFontTx/>
+              <a:buNone/>
+              <a:tabLst/>
+              <a:defRPr/>
+            </a:pPr>
+            <a:r>
+              <a:rPr lang="pt-PT" sz="1200" kern="1200" dirty="0">
+                <a:solidFill>
+                  <a:schemeClr val="tx1"/>
+                </a:solidFill>
+                <a:effectLst/>
+                <a:latin typeface="+mn-lt"/>
+                <a:ea typeface="+mn-ea"/>
+                <a:cs typeface="+mn-cs"/>
+              </a:rPr>
+              <a:t>Tendo em conta que o serviço </a:t>
+            </a:r>
+            <a:r>
+              <a:rPr lang="pt-PT" sz="1200" i="1" kern="1200" dirty="0" err="1">
+                <a:solidFill>
+                  <a:schemeClr val="tx1"/>
+                </a:solidFill>
+                <a:effectLst/>
+                <a:latin typeface="+mn-lt"/>
+                <a:ea typeface="+mn-ea"/>
+                <a:cs typeface="+mn-cs"/>
+              </a:rPr>
+              <a:t>Home</a:t>
+            </a:r>
+            <a:r>
+              <a:rPr lang="pt-PT" sz="1200" kern="1200" dirty="0">
+                <a:solidFill>
+                  <a:schemeClr val="tx1"/>
+                </a:solidFill>
+                <a:effectLst/>
+                <a:latin typeface="+mn-lt"/>
+                <a:ea typeface="+mn-ea"/>
+                <a:cs typeface="+mn-cs"/>
+              </a:rPr>
+              <a:t> </a:t>
+            </a:r>
+            <a:r>
+              <a:rPr lang="pt-PT" sz="1200" i="1" kern="1200" dirty="0" err="1">
+                <a:solidFill>
+                  <a:schemeClr val="tx1"/>
+                </a:solidFill>
+                <a:effectLst/>
+                <a:latin typeface="+mn-lt"/>
+                <a:ea typeface="+mn-ea"/>
+                <a:cs typeface="+mn-cs"/>
+              </a:rPr>
+              <a:t>Massage</a:t>
+            </a:r>
+            <a:r>
+              <a:rPr lang="pt-PT" sz="1200" kern="1200" dirty="0">
+                <a:solidFill>
+                  <a:schemeClr val="tx1"/>
+                </a:solidFill>
+                <a:effectLst/>
+                <a:latin typeface="+mn-lt"/>
+                <a:ea typeface="+mn-ea"/>
+                <a:cs typeface="+mn-cs"/>
+              </a:rPr>
+              <a:t> é um serviço inovador em Portugal, podemos considerar que o seu potencial é enorme.  A empresa Zen+ considera que, face ao cenário atual, poderá considerar que o projeto é um sucesso se conseguir oferecer aos seus clientes uma aplicação web intuitiva e fácil de usar, conseguir assegurar cerca de 300 clientes assíduos mensalmente e por fim, se conseguir expandir o projeto a todo o país. </a:t>
+            </a:r>
+          </a:p>
+        </p:txBody>
+      </p:sp>
+      <p:sp>
+        <p:nvSpPr>
+          <p:cNvPr id="4" name="Marcador de Posição do Número do Diapositivo 3"/>
+          <p:cNvSpPr>
+            <a:spLocks noGrp="1"/>
+          </p:cNvSpPr>
+          <p:nvPr>
+            <p:ph type="sldNum" sz="quarter" idx="10"/>
+          </p:nvPr>
+        </p:nvSpPr>
+        <p:spPr/>
+        <p:txBody>
+          <a:bodyPr/>
+          <a:lstStyle/>
+          <a:p>
+            <a:fld id="{071F3FBA-D23A-4285-A104-7C7E32F747DD}" type="slidenum">
+              <a:rPr lang="pt-PT" smtClean="0"/>
+              <a:t>12</a:t>
+            </a:fld>
+            <a:endParaRPr lang="pt-PT"/>
+          </a:p>
+        </p:txBody>
+      </p:sp>
+    </p:spTree>
+    <p:extLst>
+      <p:ext uri="{BB962C8B-B14F-4D97-AF65-F5344CB8AC3E}">
+        <p14:creationId xmlns:p14="http://schemas.microsoft.com/office/powerpoint/2010/main" val="3496884534"/>
       </p:ext>
     </p:extLst>
   </p:cSld>
@@ -23610,8 +24452,8 @@
         </p:blipFill>
         <p:spPr>
           <a:xfrm>
-            <a:off x="2912098" y="132522"/>
-            <a:ext cx="6367804" cy="4002157"/>
+            <a:off x="3191064" y="519916"/>
+            <a:ext cx="5809871" cy="3651497"/>
           </a:xfrm>
           <a:prstGeom prst="rect">
             <a:avLst/>
@@ -24313,7 +25155,7 @@
           </p:nvPr>
         </p:nvPicPr>
         <p:blipFill>
-          <a:blip r:embed="rId2"/>
+          <a:blip r:embed="rId3"/>
           <a:stretch>
             <a:fillRect/>
           </a:stretch>
@@ -24787,7 +25629,7 @@
         </p:xfrm>
         <a:graphic>
           <a:graphicData uri="http://schemas.openxmlformats.org/drawingml/2006/diagram">
-            <dgm:relIds xmlns:dgm="http://schemas.openxmlformats.org/drawingml/2006/diagram" xmlns:r="http://schemas.openxmlformats.org/officeDocument/2006/relationships" r:dm="rId2" r:lo="rId3" r:qs="rId4" r:cs="rId5"/>
+            <dgm:relIds xmlns:dgm="http://schemas.openxmlformats.org/drawingml/2006/diagram" xmlns:r="http://schemas.openxmlformats.org/officeDocument/2006/relationships" r:dm="rId3" r:lo="rId4" r:qs="rId5" r:cs="rId6"/>
           </a:graphicData>
         </a:graphic>
       </p:graphicFrame>
@@ -25837,7 +26679,7 @@
         </p:xfrm>
         <a:graphic>
           <a:graphicData uri="http://schemas.openxmlformats.org/drawingml/2006/diagram">
-            <dgm:relIds xmlns:dgm="http://schemas.openxmlformats.org/drawingml/2006/diagram" xmlns:r="http://schemas.openxmlformats.org/officeDocument/2006/relationships" r:dm="rId2" r:lo="rId3" r:qs="rId4" r:cs="rId5"/>
+            <dgm:relIds xmlns:dgm="http://schemas.openxmlformats.org/drawingml/2006/diagram" xmlns:r="http://schemas.openxmlformats.org/officeDocument/2006/relationships" r:dm="rId3" r:lo="rId4" r:qs="rId5" r:cs="rId6"/>
           </a:graphicData>
         </a:graphic>
       </p:graphicFrame>
@@ -25957,7 +26799,15 @@
             </a:r>
             <a:r>
               <a:rPr lang="pt-PT" dirty="0"/>
-              <a:t>decidiu lançar uma plataforma Web onde poderá dar a conhecer aos clientes os vários serviços oferecidos e  os diferentes custos associados.</a:t>
+              <a:t>decidiu lançar uma plataforma </a:t>
+            </a:r>
+            <a:r>
+              <a:rPr lang="pt-PT" i="1" dirty="0"/>
+              <a:t>Web</a:t>
+            </a:r>
+            <a:r>
+              <a:rPr lang="pt-PT" dirty="0"/>
+              <a:t> onde poderá dar a conhecer aos clientes os vários serviços oferecidos e  os diferentes custos associados.</a:t>
             </a:r>
           </a:p>
         </p:txBody>
@@ -25975,7 +26825,7 @@
           <p:nvPr>
             <p:extLst>
               <p:ext uri="{D42A27DB-BD31-4B8C-83A1-F6EECF244321}">
-                <p14:modId xmlns:p14="http://schemas.microsoft.com/office/powerpoint/2010/main" val="2907724428"/>
+                <p14:modId xmlns:p14="http://schemas.microsoft.com/office/powerpoint/2010/main" val="3254992223"/>
               </p:ext>
             </p:extLst>
           </p:nvPr>
@@ -25986,7 +26836,7 @@
         </p:xfrm>
         <a:graphic>
           <a:graphicData uri="http://schemas.openxmlformats.org/drawingml/2006/diagram">
-            <dgm:relIds xmlns:dgm="http://schemas.openxmlformats.org/drawingml/2006/diagram" xmlns:r="http://schemas.openxmlformats.org/officeDocument/2006/relationships" r:dm="rId2" r:lo="rId3" r:qs="rId4" r:cs="rId5"/>
+            <dgm:relIds xmlns:dgm="http://schemas.openxmlformats.org/drawingml/2006/diagram" xmlns:r="http://schemas.openxmlformats.org/officeDocument/2006/relationships" r:dm="rId3" r:lo="rId4" r:qs="rId5" r:cs="rId6"/>
           </a:graphicData>
         </a:graphic>
       </p:graphicFrame>
@@ -26414,7 +27264,7 @@
             <p:ph idx="1"/>
             <p:extLst>
               <p:ext uri="{D42A27DB-BD31-4B8C-83A1-F6EECF244321}">
-                <p14:modId xmlns:p14="http://schemas.microsoft.com/office/powerpoint/2010/main" val="4269116086"/>
+                <p14:modId xmlns:p14="http://schemas.microsoft.com/office/powerpoint/2010/main" val="4291533821"/>
               </p:ext>
             </p:extLst>
           </p:nvPr>
@@ -26425,7 +27275,7 @@
         </p:xfrm>
         <a:graphic>
           <a:graphicData uri="http://schemas.openxmlformats.org/drawingml/2006/diagram">
-            <dgm:relIds xmlns:dgm="http://schemas.openxmlformats.org/drawingml/2006/diagram" xmlns:r="http://schemas.openxmlformats.org/officeDocument/2006/relationships" r:dm="rId2" r:lo="rId3" r:qs="rId4" r:cs="rId5"/>
+            <dgm:relIds xmlns:dgm="http://schemas.openxmlformats.org/drawingml/2006/diagram" xmlns:r="http://schemas.openxmlformats.org/officeDocument/2006/relationships" r:dm="rId3" r:lo="rId4" r:qs="rId5" r:cs="rId6"/>
           </a:graphicData>
         </a:graphic>
       </p:graphicFrame>
@@ -27231,7 +28081,7 @@
         </p:xfrm>
         <a:graphic>
           <a:graphicData uri="http://schemas.openxmlformats.org/drawingml/2006/diagram">
-            <dgm:relIds xmlns:dgm="http://schemas.openxmlformats.org/drawingml/2006/diagram" xmlns:r="http://schemas.openxmlformats.org/officeDocument/2006/relationships" r:dm="rId2" r:lo="rId3" r:qs="rId4" r:cs="rId5"/>
+            <dgm:relIds xmlns:dgm="http://schemas.openxmlformats.org/drawingml/2006/diagram" xmlns:r="http://schemas.openxmlformats.org/officeDocument/2006/relationships" r:dm="rId3" r:lo="rId4" r:qs="rId5" r:cs="rId6"/>
           </a:graphicData>
         </a:graphic>
       </p:graphicFrame>

</xml_diff>